<commit_message>
Informatīvā materiāla uzdevumi, bez koda
</commit_message>
<xml_diff>
--- a/Teksta datnes informatīvais materiāls.pptx
+++ b/Teksta datnes informatīvais materiāls.pptx
@@ -10,7 +10,16 @@
     <p:sldId id="257" r:id="rId4"/>
     <p:sldId id="260" r:id="rId5"/>
     <p:sldId id="261" r:id="rId6"/>
-    <p:sldId id="258" r:id="rId7"/>
+    <p:sldId id="262" r:id="rId7"/>
+    <p:sldId id="263" r:id="rId8"/>
+    <p:sldId id="264" r:id="rId9"/>
+    <p:sldId id="265" r:id="rId10"/>
+    <p:sldId id="266" r:id="rId11"/>
+    <p:sldId id="267" r:id="rId12"/>
+    <p:sldId id="268" r:id="rId13"/>
+    <p:sldId id="269" r:id="rId14"/>
+    <p:sldId id="270" r:id="rId15"/>
+    <p:sldId id="258" r:id="rId16"/>
   </p:sldIdLst>
   <p:sldSz cx="9144000" cy="6858000" type="screen4x3"/>
   <p:notesSz cx="6858000" cy="9144000"/>
@@ -6527,6 +6536,476 @@
 </p:sld>
 </file>
 
+<file path=ppt/slides/slide10.xml><?xml version="1.0" encoding="utf-8"?>
+<p:sld xmlns:a="http://schemas.openxmlformats.org/drawingml/2006/main" xmlns:r="http://schemas.openxmlformats.org/officeDocument/2006/relationships" xmlns:p="http://schemas.openxmlformats.org/presentationml/2006/main">
+  <p:cSld>
+    <p:spTree>
+      <p:nvGrpSpPr>
+        <p:cNvPr id="1" name=""/>
+        <p:cNvGrpSpPr/>
+        <p:nvPr/>
+      </p:nvGrpSpPr>
+      <p:grpSpPr>
+        <a:xfrm>
+          <a:off x="0" y="0"/>
+          <a:ext cx="0" cy="0"/>
+          <a:chOff x="0" y="0"/>
+          <a:chExt cx="0" cy="0"/>
+        </a:xfrm>
+      </p:grpSpPr>
+      <p:sp>
+        <p:nvSpPr>
+          <p:cNvPr id="2" name="Title 1"/>
+          <p:cNvSpPr>
+            <a:spLocks noGrp="1"/>
+          </p:cNvSpPr>
+          <p:nvPr>
+            <p:ph type="title"/>
+          </p:nvPr>
+        </p:nvSpPr>
+        <p:spPr/>
+        <p:txBody>
+          <a:bodyPr/>
+          <a:lstStyle/>
+          <a:p>
+            <a:r>
+              <a:rPr lang="lv-LV" dirty="0" smtClean="0"/>
+              <a:t>Piemērs</a:t>
+            </a:r>
+            <a:endParaRPr lang="lv-LV" dirty="0"/>
+          </a:p>
+        </p:txBody>
+      </p:sp>
+      <p:sp>
+        <p:nvSpPr>
+          <p:cNvPr id="3" name="Content Placeholder 2"/>
+          <p:cNvSpPr>
+            <a:spLocks noGrp="1"/>
+          </p:cNvSpPr>
+          <p:nvPr>
+            <p:ph idx="1"/>
+          </p:nvPr>
+        </p:nvSpPr>
+        <p:spPr/>
+        <p:txBody>
+          <a:bodyPr/>
+          <a:lstStyle/>
+          <a:p>
+            <a:endParaRPr lang="lv-LV"/>
+          </a:p>
+        </p:txBody>
+      </p:sp>
+    </p:spTree>
+  </p:cSld>
+  <p:clrMapOvr>
+    <a:masterClrMapping/>
+  </p:clrMapOvr>
+</p:sld>
+</file>
+
+<file path=ppt/slides/slide11.xml><?xml version="1.0" encoding="utf-8"?>
+<p:sld xmlns:a="http://schemas.openxmlformats.org/drawingml/2006/main" xmlns:r="http://schemas.openxmlformats.org/officeDocument/2006/relationships" xmlns:p="http://schemas.openxmlformats.org/presentationml/2006/main">
+  <p:cSld>
+    <p:spTree>
+      <p:nvGrpSpPr>
+        <p:cNvPr id="1" name=""/>
+        <p:cNvGrpSpPr/>
+        <p:nvPr/>
+      </p:nvGrpSpPr>
+      <p:grpSpPr>
+        <a:xfrm>
+          <a:off x="0" y="0"/>
+          <a:ext cx="0" cy="0"/>
+          <a:chOff x="0" y="0"/>
+          <a:chExt cx="0" cy="0"/>
+        </a:xfrm>
+      </p:grpSpPr>
+      <p:sp>
+        <p:nvSpPr>
+          <p:cNvPr id="2" name="Title 1"/>
+          <p:cNvSpPr>
+            <a:spLocks noGrp="1"/>
+          </p:cNvSpPr>
+          <p:nvPr>
+            <p:ph type="title"/>
+          </p:nvPr>
+        </p:nvSpPr>
+        <p:spPr/>
+        <p:txBody>
+          <a:bodyPr/>
+          <a:lstStyle/>
+          <a:p>
+            <a:r>
+              <a:rPr lang="lv-LV" dirty="0" smtClean="0"/>
+              <a:t>4.Uzdevuma piemers</a:t>
+            </a:r>
+            <a:endParaRPr lang="lv-LV" dirty="0"/>
+          </a:p>
+        </p:txBody>
+      </p:sp>
+      <p:sp>
+        <p:nvSpPr>
+          <p:cNvPr id="3" name="Content Placeholder 2"/>
+          <p:cNvSpPr>
+            <a:spLocks noGrp="1"/>
+          </p:cNvSpPr>
+          <p:nvPr>
+            <p:ph idx="1"/>
+          </p:nvPr>
+        </p:nvSpPr>
+        <p:spPr/>
+        <p:txBody>
+          <a:bodyPr/>
+          <a:lstStyle/>
+          <a:p>
+            <a:r>
+              <a:rPr lang="lv-LV" dirty="0" smtClean="0"/>
+              <a:t>Izveidot programmu, kas lietotāja ievadīto tekstu izvada konsolē, bet tikai otrādi apmestu, piemēram, no “sula” uz “alus”.</a:t>
+            </a:r>
+            <a:endParaRPr lang="lv-LV" dirty="0"/>
+          </a:p>
+        </p:txBody>
+      </p:sp>
+    </p:spTree>
+  </p:cSld>
+  <p:clrMapOvr>
+    <a:masterClrMapping/>
+  </p:clrMapOvr>
+</p:sld>
+</file>
+
+<file path=ppt/slides/slide12.xml><?xml version="1.0" encoding="utf-8"?>
+<p:sld xmlns:a="http://schemas.openxmlformats.org/drawingml/2006/main" xmlns:r="http://schemas.openxmlformats.org/officeDocument/2006/relationships" xmlns:p="http://schemas.openxmlformats.org/presentationml/2006/main">
+  <p:cSld>
+    <p:spTree>
+      <p:nvGrpSpPr>
+        <p:cNvPr id="1" name=""/>
+        <p:cNvGrpSpPr/>
+        <p:nvPr/>
+      </p:nvGrpSpPr>
+      <p:grpSpPr>
+        <a:xfrm>
+          <a:off x="0" y="0"/>
+          <a:ext cx="0" cy="0"/>
+          <a:chOff x="0" y="0"/>
+          <a:chExt cx="0" cy="0"/>
+        </a:xfrm>
+      </p:grpSpPr>
+      <p:sp>
+        <p:nvSpPr>
+          <p:cNvPr id="2" name="Title 1"/>
+          <p:cNvSpPr>
+            <a:spLocks noGrp="1"/>
+          </p:cNvSpPr>
+          <p:nvPr>
+            <p:ph type="title"/>
+          </p:nvPr>
+        </p:nvSpPr>
+        <p:spPr/>
+        <p:txBody>
+          <a:bodyPr/>
+          <a:lstStyle/>
+          <a:p>
+            <a:r>
+              <a:rPr lang="lv-LV" dirty="0" smtClean="0"/>
+              <a:t>Piemērs</a:t>
+            </a:r>
+            <a:endParaRPr lang="lv-LV" dirty="0"/>
+          </a:p>
+        </p:txBody>
+      </p:sp>
+      <p:sp>
+        <p:nvSpPr>
+          <p:cNvPr id="3" name="Content Placeholder 2"/>
+          <p:cNvSpPr>
+            <a:spLocks noGrp="1"/>
+          </p:cNvSpPr>
+          <p:nvPr>
+            <p:ph idx="1"/>
+          </p:nvPr>
+        </p:nvSpPr>
+        <p:spPr/>
+        <p:txBody>
+          <a:bodyPr/>
+          <a:lstStyle/>
+          <a:p>
+            <a:endParaRPr lang="lv-LV"/>
+          </a:p>
+        </p:txBody>
+      </p:sp>
+    </p:spTree>
+  </p:cSld>
+  <p:clrMapOvr>
+    <a:masterClrMapping/>
+  </p:clrMapOvr>
+</p:sld>
+</file>
+
+<file path=ppt/slides/slide13.xml><?xml version="1.0" encoding="utf-8"?>
+<p:sld xmlns:a="http://schemas.openxmlformats.org/drawingml/2006/main" xmlns:r="http://schemas.openxmlformats.org/officeDocument/2006/relationships" xmlns:p="http://schemas.openxmlformats.org/presentationml/2006/main">
+  <p:cSld>
+    <p:spTree>
+      <p:nvGrpSpPr>
+        <p:cNvPr id="1" name=""/>
+        <p:cNvGrpSpPr/>
+        <p:nvPr/>
+      </p:nvGrpSpPr>
+      <p:grpSpPr>
+        <a:xfrm>
+          <a:off x="0" y="0"/>
+          <a:ext cx="0" cy="0"/>
+          <a:chOff x="0" y="0"/>
+          <a:chExt cx="0" cy="0"/>
+        </a:xfrm>
+      </p:grpSpPr>
+      <p:sp>
+        <p:nvSpPr>
+          <p:cNvPr id="2" name="Title 1"/>
+          <p:cNvSpPr>
+            <a:spLocks noGrp="1"/>
+          </p:cNvSpPr>
+          <p:nvPr>
+            <p:ph type="title"/>
+          </p:nvPr>
+        </p:nvSpPr>
+        <p:spPr/>
+        <p:txBody>
+          <a:bodyPr/>
+          <a:lstStyle/>
+          <a:p>
+            <a:r>
+              <a:rPr lang="lv-LV" dirty="0" smtClean="0"/>
+              <a:t>5.Uzdevuma piemērs</a:t>
+            </a:r>
+            <a:endParaRPr lang="lv-LV" dirty="0"/>
+          </a:p>
+        </p:txBody>
+      </p:sp>
+      <p:sp>
+        <p:nvSpPr>
+          <p:cNvPr id="3" name="Content Placeholder 2"/>
+          <p:cNvSpPr>
+            <a:spLocks noGrp="1"/>
+          </p:cNvSpPr>
+          <p:nvPr>
+            <p:ph idx="1"/>
+          </p:nvPr>
+        </p:nvSpPr>
+        <p:spPr/>
+        <p:txBody>
+          <a:bodyPr/>
+          <a:lstStyle/>
+          <a:p>
+            <a:r>
+              <a:rPr lang="lv-LV" dirty="0" smtClean="0"/>
+              <a:t>Izveidot programmu, kas izvada un ieliek failā ASCII.txt šādu ASCII koda zīmējumu:</a:t>
+            </a:r>
+          </a:p>
+          <a:p>
+            <a:pPr>
+              <a:buNone/>
+            </a:pPr>
+            <a:endParaRPr lang="lv-LV" sz="2000" dirty="0"/>
+          </a:p>
+        </p:txBody>
+      </p:sp>
+      <p:pic>
+        <p:nvPicPr>
+          <p:cNvPr id="1026" name="Picture 2"/>
+          <p:cNvPicPr>
+            <a:picLocks noChangeAspect="1" noChangeArrowheads="1"/>
+          </p:cNvPicPr>
+          <p:nvPr/>
+        </p:nvPicPr>
+        <p:blipFill>
+          <a:blip r:embed="rId2"/>
+          <a:srcRect/>
+          <a:stretch>
+            <a:fillRect/>
+          </a:stretch>
+        </p:blipFill>
+        <p:spPr bwMode="auto">
+          <a:xfrm>
+            <a:off x="1500166" y="3143248"/>
+            <a:ext cx="1571636" cy="2364533"/>
+          </a:xfrm>
+          <a:prstGeom prst="rect">
+            <a:avLst/>
+          </a:prstGeom>
+          <a:noFill/>
+          <a:ln w="9525">
+            <a:noFill/>
+            <a:miter lim="800000"/>
+            <a:headEnd/>
+            <a:tailEnd/>
+          </a:ln>
+          <a:effectLst/>
+        </p:spPr>
+      </p:pic>
+    </p:spTree>
+  </p:cSld>
+  <p:clrMapOvr>
+    <a:masterClrMapping/>
+  </p:clrMapOvr>
+</p:sld>
+</file>
+
+<file path=ppt/slides/slide14.xml><?xml version="1.0" encoding="utf-8"?>
+<p:sld xmlns:a="http://schemas.openxmlformats.org/drawingml/2006/main" xmlns:r="http://schemas.openxmlformats.org/officeDocument/2006/relationships" xmlns:p="http://schemas.openxmlformats.org/presentationml/2006/main">
+  <p:cSld>
+    <p:spTree>
+      <p:nvGrpSpPr>
+        <p:cNvPr id="1" name=""/>
+        <p:cNvGrpSpPr/>
+        <p:nvPr/>
+      </p:nvGrpSpPr>
+      <p:grpSpPr>
+        <a:xfrm>
+          <a:off x="0" y="0"/>
+          <a:ext cx="0" cy="0"/>
+          <a:chOff x="0" y="0"/>
+          <a:chExt cx="0" cy="0"/>
+        </a:xfrm>
+      </p:grpSpPr>
+      <p:sp>
+        <p:nvSpPr>
+          <p:cNvPr id="2" name="Title 1"/>
+          <p:cNvSpPr>
+            <a:spLocks noGrp="1"/>
+          </p:cNvSpPr>
+          <p:nvPr>
+            <p:ph type="title"/>
+          </p:nvPr>
+        </p:nvSpPr>
+        <p:spPr/>
+        <p:txBody>
+          <a:bodyPr/>
+          <a:lstStyle/>
+          <a:p>
+            <a:r>
+              <a:rPr lang="lv-LV" dirty="0" smtClean="0"/>
+              <a:t>Piemērs</a:t>
+            </a:r>
+            <a:endParaRPr lang="lv-LV" dirty="0"/>
+          </a:p>
+        </p:txBody>
+      </p:sp>
+      <p:sp>
+        <p:nvSpPr>
+          <p:cNvPr id="3" name="Content Placeholder 2"/>
+          <p:cNvSpPr>
+            <a:spLocks noGrp="1"/>
+          </p:cNvSpPr>
+          <p:nvPr>
+            <p:ph idx="1"/>
+          </p:nvPr>
+        </p:nvSpPr>
+        <p:spPr/>
+        <p:txBody>
+          <a:bodyPr/>
+          <a:lstStyle/>
+          <a:p>
+            <a:endParaRPr lang="lv-LV"/>
+          </a:p>
+        </p:txBody>
+      </p:sp>
+    </p:spTree>
+  </p:cSld>
+  <p:clrMapOvr>
+    <a:masterClrMapping/>
+  </p:clrMapOvr>
+</p:sld>
+</file>
+
+<file path=ppt/slides/slide15.xml><?xml version="1.0" encoding="utf-8"?>
+<p:sld xmlns:a="http://schemas.openxmlformats.org/drawingml/2006/main" xmlns:r="http://schemas.openxmlformats.org/officeDocument/2006/relationships" xmlns:p="http://schemas.openxmlformats.org/presentationml/2006/main">
+  <p:cSld>
+    <p:spTree>
+      <p:nvGrpSpPr>
+        <p:cNvPr id="1" name=""/>
+        <p:cNvGrpSpPr/>
+        <p:nvPr/>
+      </p:nvGrpSpPr>
+      <p:grpSpPr>
+        <a:xfrm>
+          <a:off x="0" y="0"/>
+          <a:ext cx="0" cy="0"/>
+          <a:chOff x="0" y="0"/>
+          <a:chExt cx="0" cy="0"/>
+        </a:xfrm>
+      </p:grpSpPr>
+      <p:sp>
+        <p:nvSpPr>
+          <p:cNvPr id="2" name="Title 1"/>
+          <p:cNvSpPr>
+            <a:spLocks noGrp="1"/>
+          </p:cNvSpPr>
+          <p:nvPr>
+            <p:ph type="title"/>
+          </p:nvPr>
+        </p:nvSpPr>
+        <p:spPr/>
+        <p:txBody>
+          <a:bodyPr/>
+          <a:lstStyle/>
+          <a:p>
+            <a:r>
+              <a:rPr lang="lv-LV" dirty="0" smtClean="0"/>
+              <a:t>Avoti</a:t>
+            </a:r>
+            <a:endParaRPr lang="lv-LV" dirty="0"/>
+          </a:p>
+        </p:txBody>
+      </p:sp>
+      <p:sp>
+        <p:nvSpPr>
+          <p:cNvPr id="3" name="Content Placeholder 2"/>
+          <p:cNvSpPr>
+            <a:spLocks noGrp="1"/>
+          </p:cNvSpPr>
+          <p:nvPr>
+            <p:ph idx="1"/>
+          </p:nvPr>
+        </p:nvSpPr>
+        <p:spPr/>
+        <p:txBody>
+          <a:bodyPr/>
+          <a:lstStyle/>
+          <a:p>
+            <a:r>
+              <a:rPr lang="lv-LV" sz="2400" dirty="0" smtClean="0">
+                <a:hlinkClick r:id="rId2"/>
+              </a:rPr>
+              <a:t>http://</a:t>
+            </a:r>
+            <a:r>
+              <a:rPr lang="lv-LV" sz="2400" dirty="0" smtClean="0">
+                <a:hlinkClick r:id="rId2"/>
+              </a:rPr>
+              <a:t>www.yorku.ca/pkashiya/binary/text-data.html</a:t>
+            </a:r>
+            <a:endParaRPr lang="lv-LV" sz="2400" dirty="0" smtClean="0"/>
+          </a:p>
+          <a:p>
+            <a:r>
+              <a:rPr lang="lv-LV" sz="2400" dirty="0" smtClean="0"/>
+              <a:t>https://www.asciiart.eu/electronics/calculators</a:t>
+            </a:r>
+            <a:endParaRPr lang="lv-LV" sz="2400" dirty="0" smtClean="0"/>
+          </a:p>
+          <a:p>
+            <a:endParaRPr lang="lv-LV" dirty="0"/>
+          </a:p>
+        </p:txBody>
+      </p:sp>
+    </p:spTree>
+  </p:cSld>
+  <p:clrMapOvr>
+    <a:masterClrMapping/>
+  </p:clrMapOvr>
+</p:sld>
+</file>
+
 <file path=ppt/slides/slide2.xml><?xml version="1.0" encoding="utf-8"?>
 <p:sld xmlns:a="http://schemas.openxmlformats.org/drawingml/2006/main" xmlns:r="http://schemas.openxmlformats.org/officeDocument/2006/relationships" xmlns:p="http://schemas.openxmlformats.org/presentationml/2006/main">
   <p:cSld>
@@ -6584,8 +7063,85 @@
           <a:p>
             <a:r>
               <a:rPr lang="lv-LV" dirty="0" smtClean="0"/>
-              <a:t>Kas ir teksta datnes?</a:t>
-            </a:r>
+              <a:t>Kas ir teksta datnes</a:t>
+            </a:r>
+            <a:r>
+              <a:rPr lang="lv-LV" dirty="0" smtClean="0"/>
+              <a:t>?</a:t>
+            </a:r>
+          </a:p>
+          <a:p>
+            <a:r>
+              <a:rPr lang="lv-LV" dirty="0" smtClean="0"/>
+              <a:t>Kā C++ darbojās ar teksta datnēm</a:t>
+            </a:r>
+            <a:r>
+              <a:rPr lang="lv-LV" dirty="0" smtClean="0"/>
+              <a:t>?</a:t>
+            </a:r>
+          </a:p>
+          <a:p>
+            <a:r>
+              <a:rPr lang="lv-LV" dirty="0" smtClean="0"/>
+              <a:t>1. Uzdevuma </a:t>
+            </a:r>
+            <a:r>
+              <a:rPr lang="lv-LV" dirty="0" smtClean="0"/>
+              <a:t>piemērs</a:t>
+            </a:r>
+          </a:p>
+          <a:p>
+            <a:r>
+              <a:rPr lang="lv-LV" dirty="0" smtClean="0"/>
+              <a:t>2. </a:t>
+            </a:r>
+            <a:r>
+              <a:rPr lang="lv-LV" dirty="0" smtClean="0"/>
+              <a:t>Uzdevuma </a:t>
+            </a:r>
+            <a:r>
+              <a:rPr lang="lv-LV" dirty="0" smtClean="0"/>
+              <a:t>piemērs</a:t>
+            </a:r>
+          </a:p>
+          <a:p>
+            <a:r>
+              <a:rPr lang="lv-LV" dirty="0" smtClean="0"/>
+              <a:t>3. </a:t>
+            </a:r>
+            <a:r>
+              <a:rPr lang="lv-LV" dirty="0" smtClean="0"/>
+              <a:t>Uzdevuma </a:t>
+            </a:r>
+            <a:r>
+              <a:rPr lang="lv-LV" dirty="0" smtClean="0"/>
+              <a:t>piemērs</a:t>
+            </a:r>
+          </a:p>
+          <a:p>
+            <a:r>
+              <a:rPr lang="lv-LV" dirty="0" smtClean="0"/>
+              <a:t>4. </a:t>
+            </a:r>
+            <a:r>
+              <a:rPr lang="lv-LV" dirty="0" smtClean="0"/>
+              <a:t>Uzdevuma </a:t>
+            </a:r>
+            <a:r>
+              <a:rPr lang="lv-LV" dirty="0" smtClean="0"/>
+              <a:t>piemērs</a:t>
+            </a:r>
+          </a:p>
+          <a:p>
+            <a:r>
+              <a:rPr lang="lv-LV" dirty="0" smtClean="0"/>
+              <a:t>5. </a:t>
+            </a:r>
+            <a:r>
+              <a:rPr lang="lv-LV" dirty="0" smtClean="0"/>
+              <a:t>Uzdevuma piemērs</a:t>
+            </a:r>
+            <a:endParaRPr lang="lv-LV" dirty="0" smtClean="0"/>
           </a:p>
           <a:p>
             <a:endParaRPr lang="lv-LV" dirty="0"/>
@@ -6659,23 +7215,7 @@
           <a:p>
             <a:r>
               <a:rPr lang="lv-LV" sz="2800" dirty="0" smtClean="0"/>
-              <a:t>Praktiski </a:t>
-            </a:r>
-            <a:r>
-              <a:rPr lang="lv-LV" sz="2800" dirty="0" smtClean="0"/>
-              <a:t>visos datoros burtciparu datiem </a:t>
-            </a:r>
-            <a:r>
-              <a:rPr lang="lv-LV" sz="2800" dirty="0" smtClean="0"/>
-              <a:t>un īpašajām </a:t>
-            </a:r>
-            <a:r>
-              <a:rPr lang="lv-LV" sz="2800" dirty="0" smtClean="0"/>
-              <a:t>rakstzīmēm katram tiek piešķirta noteikta binārā vērtība, ko sauc par rakstzīmju kodu</a:t>
-            </a:r>
-            <a:r>
-              <a:rPr lang="lv-LV" sz="2800" dirty="0" smtClean="0"/>
-              <a:t>.</a:t>
+              <a:t>Praktiski visos datoros burtciparu datiem un īpašajām rakstzīmēm katram tiek piešķirta noteikta binārā vērtība, ko sauc par rakstzīmju kodu.</a:t>
             </a:r>
           </a:p>
           <a:p>
@@ -6760,45 +7300,70 @@
         <p:spPr/>
         <p:txBody>
           <a:bodyPr>
-            <a:normAutofit lnSpcReduction="10000"/>
+            <a:normAutofit/>
           </a:bodyPr>
           <a:lstStyle/>
           <a:p>
             <a:r>
-              <a:rPr lang="lv-LV" sz="2800" dirty="0" smtClean="0"/>
-              <a:t>Ir dažādi veidi kā var izvadīt un ievadīt teksta datnes</a:t>
-            </a:r>
-          </a:p>
-          <a:p>
-            <a:r>
-              <a:rPr lang="lv-LV" sz="2800" dirty="0" smtClean="0"/>
-              <a:t>Izvade: cout&lt;&lt;, printf(), system(), </a:t>
-            </a:r>
-          </a:p>
-          <a:p>
-            <a:r>
-              <a:rPr lang="lv-LV" sz="2800" dirty="0" smtClean="0"/>
-              <a:t>Ievade: cin&gt;&gt;</a:t>
-            </a:r>
-          </a:p>
-          <a:p>
-            <a:r>
-              <a:rPr lang="lv-LV" sz="2800" dirty="0" smtClean="0"/>
+              <a:rPr lang="lv-LV" sz="2400" dirty="0" smtClean="0"/>
+              <a:t>Ir dažādi veidi kā var izvadīt un ievadīt teksta </a:t>
+            </a:r>
+            <a:r>
+              <a:rPr lang="lv-LV" sz="2400" dirty="0" smtClean="0"/>
+              <a:t>datnes.</a:t>
+            </a:r>
+            <a:endParaRPr lang="lv-LV" sz="2400" dirty="0" smtClean="0"/>
+          </a:p>
+          <a:p>
+            <a:r>
+              <a:rPr lang="lv-LV" sz="2400" dirty="0" smtClean="0"/>
+              <a:t>Izvade: cout&lt;&lt;, printf(), system</a:t>
+            </a:r>
+            <a:r>
+              <a:rPr lang="lv-LV" sz="2400" dirty="0" smtClean="0"/>
+              <a:t>().</a:t>
+            </a:r>
+            <a:endParaRPr lang="lv-LV" sz="2400" dirty="0" smtClean="0"/>
+          </a:p>
+          <a:p>
+            <a:r>
+              <a:rPr lang="lv-LV" sz="2400" dirty="0" smtClean="0"/>
+              <a:t>Ievade: cin</a:t>
+            </a:r>
+            <a:r>
+              <a:rPr lang="lv-LV" sz="2400" dirty="0" smtClean="0"/>
+              <a:t>&gt;&gt;.</a:t>
+            </a:r>
+            <a:endParaRPr lang="lv-LV" sz="2400" dirty="0" smtClean="0"/>
+          </a:p>
+          <a:p>
+            <a:r>
+              <a:rPr lang="lv-LV" sz="2400" dirty="0" smtClean="0"/>
               <a:t>Protams, var daudz dažādus interface taisīt, kur ir savi veidi kā ievadīt un izvadīt tekstu, GUI, extensions.</a:t>
             </a:r>
           </a:p>
           <a:p>
             <a:r>
-              <a:rPr lang="lv-LV" sz="2800" dirty="0" smtClean="0"/>
+              <a:rPr lang="lv-LV" sz="2400" dirty="0" smtClean="0"/>
               <a:t>Teksts C++ ir principā ka string, tādēļ ar to var darboties matemātiski. </a:t>
             </a:r>
           </a:p>
           <a:p>
             <a:r>
-              <a:rPr lang="lv-LV" sz="2800" dirty="0" smtClean="0"/>
-              <a:t>Viena string vērtība ir char masīvs.</a:t>
-            </a:r>
-            <a:endParaRPr lang="lv-LV" sz="2800" dirty="0"/>
+              <a:rPr lang="lv-LV" sz="2400" dirty="0" smtClean="0"/>
+              <a:t>Viena string vērtība ir char masīvs</a:t>
+            </a:r>
+            <a:r>
+              <a:rPr lang="lv-LV" sz="2400" dirty="0" smtClean="0"/>
+              <a:t>.</a:t>
+            </a:r>
+          </a:p>
+          <a:p>
+            <a:r>
+              <a:rPr lang="lv-LV" sz="2400" dirty="0" smtClean="0"/>
+              <a:t>Var arī nolasīt un izprintēt ar ofstream, ifstream, fstream palīdzību.</a:t>
+            </a:r>
+            <a:endParaRPr lang="lv-LV" sz="2400" dirty="0"/>
           </a:p>
         </p:txBody>
       </p:sp>
@@ -6866,10 +7431,14 @@
           <a:lstStyle/>
           <a:p>
             <a:r>
-              <a:rPr lang="lv-LV" smtClean="0"/>
-              <a:t>Ar string mainīgo palīdzību un datnes ievades palīdzību</a:t>
-            </a:r>
-            <a:endParaRPr lang="lv-LV"/>
+              <a:rPr lang="lv-LV" dirty="0" smtClean="0"/>
+              <a:t>Ar string mainīgo palīdzību un datnes ievades </a:t>
+            </a:r>
+            <a:r>
+              <a:rPr lang="lv-LV" dirty="0" smtClean="0"/>
+              <a:t>palīdzību lietotājam jāsaliek kopā teikums “Man miegs nāk ;).”(konsolē paziņo teikumu). Nosacījums ir tāds, ka ir jāizmanto par katru vārdu savs string mainīgais kuru lietotājs ievada.</a:t>
+            </a:r>
+            <a:endParaRPr lang="lv-LV" dirty="0"/>
           </a:p>
         </p:txBody>
       </p:sp>
@@ -6915,7 +7484,7 @@
           <a:p>
             <a:r>
               <a:rPr lang="lv-LV" dirty="0" smtClean="0"/>
-              <a:t>Avoti</a:t>
+              <a:t>Piemērs</a:t>
             </a:r>
             <a:endParaRPr lang="lv-LV" dirty="0"/>
           </a:p>
@@ -6936,21 +7505,215 @@
           <a:bodyPr/>
           <a:lstStyle/>
           <a:p>
-            <a:r>
-              <a:rPr lang="lv-LV" sz="2400" dirty="0" smtClean="0">
-                <a:hlinkClick r:id="rId2"/>
-              </a:rPr>
-              <a:t>http://</a:t>
-            </a:r>
-            <a:r>
-              <a:rPr lang="lv-LV" sz="2400" dirty="0" smtClean="0">
-                <a:hlinkClick r:id="rId2"/>
-              </a:rPr>
-              <a:t>www.yorku.ca/pkashiya/binary/text-data.html</a:t>
-            </a:r>
-            <a:endParaRPr lang="lv-LV" sz="2400" dirty="0" smtClean="0"/>
-          </a:p>
-          <a:p>
+            <a:endParaRPr lang="lv-LV"/>
+          </a:p>
+        </p:txBody>
+      </p:sp>
+    </p:spTree>
+  </p:cSld>
+  <p:clrMapOvr>
+    <a:masterClrMapping/>
+  </p:clrMapOvr>
+</p:sld>
+</file>
+
+<file path=ppt/slides/slide7.xml><?xml version="1.0" encoding="utf-8"?>
+<p:sld xmlns:a="http://schemas.openxmlformats.org/drawingml/2006/main" xmlns:r="http://schemas.openxmlformats.org/officeDocument/2006/relationships" xmlns:p="http://schemas.openxmlformats.org/presentationml/2006/main">
+  <p:cSld>
+    <p:spTree>
+      <p:nvGrpSpPr>
+        <p:cNvPr id="1" name=""/>
+        <p:cNvGrpSpPr/>
+        <p:nvPr/>
+      </p:nvGrpSpPr>
+      <p:grpSpPr>
+        <a:xfrm>
+          <a:off x="0" y="0"/>
+          <a:ext cx="0" cy="0"/>
+          <a:chOff x="0" y="0"/>
+          <a:chExt cx="0" cy="0"/>
+        </a:xfrm>
+      </p:grpSpPr>
+      <p:sp>
+        <p:nvSpPr>
+          <p:cNvPr id="2" name="Title 1"/>
+          <p:cNvSpPr>
+            <a:spLocks noGrp="1"/>
+          </p:cNvSpPr>
+          <p:nvPr>
+            <p:ph type="title"/>
+          </p:nvPr>
+        </p:nvSpPr>
+        <p:spPr/>
+        <p:txBody>
+          <a:bodyPr/>
+          <a:lstStyle/>
+          <a:p>
+            <a:r>
+              <a:rPr lang="lv-LV" dirty="0" smtClean="0"/>
+              <a:t>2. Uzdevuma piemērs</a:t>
+            </a:r>
+            <a:endParaRPr lang="lv-LV" dirty="0"/>
+          </a:p>
+        </p:txBody>
+      </p:sp>
+      <p:sp>
+        <p:nvSpPr>
+          <p:cNvPr id="3" name="Content Placeholder 2"/>
+          <p:cNvSpPr>
+            <a:spLocks noGrp="1"/>
+          </p:cNvSpPr>
+          <p:nvPr>
+            <p:ph idx="1"/>
+          </p:nvPr>
+        </p:nvSpPr>
+        <p:spPr/>
+        <p:txBody>
+          <a:bodyPr/>
+          <a:lstStyle/>
+          <a:p>
+            <a:r>
+              <a:rPr lang="lv-LV" dirty="0" smtClean="0"/>
+              <a:t>No faila text.txt nolasīt teikumu(“Skola drīz beigsies!”) un ielikt string mainīgā. Pēc tam to teikumu pārveidot uz (“Skola drīz atkal sāksies!”) un tad to printēt atpakaļ text.txt failā.</a:t>
+            </a:r>
+            <a:endParaRPr lang="lv-LV" dirty="0"/>
+          </a:p>
+        </p:txBody>
+      </p:sp>
+    </p:spTree>
+  </p:cSld>
+  <p:clrMapOvr>
+    <a:masterClrMapping/>
+  </p:clrMapOvr>
+</p:sld>
+</file>
+
+<file path=ppt/slides/slide8.xml><?xml version="1.0" encoding="utf-8"?>
+<p:sld xmlns:a="http://schemas.openxmlformats.org/drawingml/2006/main" xmlns:r="http://schemas.openxmlformats.org/officeDocument/2006/relationships" xmlns:p="http://schemas.openxmlformats.org/presentationml/2006/main">
+  <p:cSld>
+    <p:spTree>
+      <p:nvGrpSpPr>
+        <p:cNvPr id="1" name=""/>
+        <p:cNvGrpSpPr/>
+        <p:nvPr/>
+      </p:nvGrpSpPr>
+      <p:grpSpPr>
+        <a:xfrm>
+          <a:off x="0" y="0"/>
+          <a:ext cx="0" cy="0"/>
+          <a:chOff x="0" y="0"/>
+          <a:chExt cx="0" cy="0"/>
+        </a:xfrm>
+      </p:grpSpPr>
+      <p:sp>
+        <p:nvSpPr>
+          <p:cNvPr id="2" name="Title 1"/>
+          <p:cNvSpPr>
+            <a:spLocks noGrp="1"/>
+          </p:cNvSpPr>
+          <p:nvPr>
+            <p:ph type="title"/>
+          </p:nvPr>
+        </p:nvSpPr>
+        <p:spPr/>
+        <p:txBody>
+          <a:bodyPr/>
+          <a:lstStyle/>
+          <a:p>
+            <a:r>
+              <a:rPr lang="lv-LV" dirty="0" smtClean="0"/>
+              <a:t>Piemērs</a:t>
+            </a:r>
+            <a:endParaRPr lang="lv-LV" dirty="0"/>
+          </a:p>
+        </p:txBody>
+      </p:sp>
+      <p:sp>
+        <p:nvSpPr>
+          <p:cNvPr id="3" name="Content Placeholder 2"/>
+          <p:cNvSpPr>
+            <a:spLocks noGrp="1"/>
+          </p:cNvSpPr>
+          <p:nvPr>
+            <p:ph idx="1"/>
+          </p:nvPr>
+        </p:nvSpPr>
+        <p:spPr/>
+        <p:txBody>
+          <a:bodyPr/>
+          <a:lstStyle/>
+          <a:p>
+            <a:endParaRPr lang="lv-LV"/>
+          </a:p>
+        </p:txBody>
+      </p:sp>
+    </p:spTree>
+  </p:cSld>
+  <p:clrMapOvr>
+    <a:masterClrMapping/>
+  </p:clrMapOvr>
+</p:sld>
+</file>
+
+<file path=ppt/slides/slide9.xml><?xml version="1.0" encoding="utf-8"?>
+<p:sld xmlns:a="http://schemas.openxmlformats.org/drawingml/2006/main" xmlns:r="http://schemas.openxmlformats.org/officeDocument/2006/relationships" xmlns:p="http://schemas.openxmlformats.org/presentationml/2006/main">
+  <p:cSld>
+    <p:spTree>
+      <p:nvGrpSpPr>
+        <p:cNvPr id="1" name=""/>
+        <p:cNvGrpSpPr/>
+        <p:nvPr/>
+      </p:nvGrpSpPr>
+      <p:grpSpPr>
+        <a:xfrm>
+          <a:off x="0" y="0"/>
+          <a:ext cx="0" cy="0"/>
+          <a:chOff x="0" y="0"/>
+          <a:chExt cx="0" cy="0"/>
+        </a:xfrm>
+      </p:grpSpPr>
+      <p:sp>
+        <p:nvSpPr>
+          <p:cNvPr id="2" name="Title 1"/>
+          <p:cNvSpPr>
+            <a:spLocks noGrp="1"/>
+          </p:cNvSpPr>
+          <p:nvPr>
+            <p:ph type="title"/>
+          </p:nvPr>
+        </p:nvSpPr>
+        <p:spPr/>
+        <p:txBody>
+          <a:bodyPr/>
+          <a:lstStyle/>
+          <a:p>
+            <a:r>
+              <a:rPr lang="lv-LV" dirty="0" smtClean="0"/>
+              <a:t>3. Uzdevuma piemērs</a:t>
+            </a:r>
+            <a:endParaRPr lang="lv-LV" dirty="0"/>
+          </a:p>
+        </p:txBody>
+      </p:sp>
+      <p:sp>
+        <p:nvSpPr>
+          <p:cNvPr id="3" name="Content Placeholder 2"/>
+          <p:cNvSpPr>
+            <a:spLocks noGrp="1"/>
+          </p:cNvSpPr>
+          <p:nvPr>
+            <p:ph idx="1"/>
+          </p:nvPr>
+        </p:nvSpPr>
+        <p:spPr/>
+        <p:txBody>
+          <a:bodyPr/>
+          <a:lstStyle/>
+          <a:p>
+            <a:r>
+              <a:rPr lang="lv-LV" dirty="0" smtClean="0"/>
+              <a:t>Izveidot programmu, kas lietotāja ievadīto tekstu izvada konsolē vienā kollonā pa vienam simbolam.</a:t>
+            </a:r>
             <a:endParaRPr lang="lv-LV" dirty="0"/>
           </a:p>
         </p:txBody>

</xml_diff>

<commit_message>
Projekta caurskatīšana un pielabošana, GATAVS PROJEKTS
</commit_message>
<xml_diff>
--- a/Teksta datnes informatīvais materiāls.pptx
+++ b/Teksta datnes informatīvais materiāls.pptx
@@ -158,7 +158,7 @@
             <a:fld id="{29F434F8-D001-41C5-B56B-022538BFE3FA}" type="datetimeFigureOut">
               <a:rPr lang="lv-LV" smtClean="0"/>
               <a:pPr/>
-              <a:t>10.06.2022</a:t>
+              <a:t>12.06.2022</a:t>
             </a:fld>
             <a:endParaRPr lang="lv-LV"/>
           </a:p>
@@ -877,7 +877,7 @@
             <a:fld id="{29F434F8-D001-41C5-B56B-022538BFE3FA}" type="datetimeFigureOut">
               <a:rPr lang="lv-LV" smtClean="0"/>
               <a:pPr/>
-              <a:t>10.06.2022</a:t>
+              <a:t>12.06.2022</a:t>
             </a:fld>
             <a:endParaRPr lang="lv-LV"/>
           </a:p>
@@ -1064,7 +1064,7 @@
             <a:fld id="{29F434F8-D001-41C5-B56B-022538BFE3FA}" type="datetimeFigureOut">
               <a:rPr lang="lv-LV" smtClean="0"/>
               <a:pPr/>
-              <a:t>10.06.2022</a:t>
+              <a:t>12.06.2022</a:t>
             </a:fld>
             <a:endParaRPr lang="lv-LV"/>
           </a:p>
@@ -1241,7 +1241,7 @@
             <a:fld id="{29F434F8-D001-41C5-B56B-022538BFE3FA}" type="datetimeFigureOut">
               <a:rPr lang="lv-LV" smtClean="0"/>
               <a:pPr/>
-              <a:t>10.06.2022</a:t>
+              <a:t>12.06.2022</a:t>
             </a:fld>
             <a:endParaRPr lang="lv-LV"/>
           </a:p>
@@ -2726,7 +2726,7 @@
             <a:fld id="{29F434F8-D001-41C5-B56B-022538BFE3FA}" type="datetimeFigureOut">
               <a:rPr lang="lv-LV" smtClean="0"/>
               <a:pPr/>
-              <a:t>10.06.2022</a:t>
+              <a:t>12.06.2022</a:t>
             </a:fld>
             <a:endParaRPr lang="lv-LV"/>
           </a:p>
@@ -3328,7 +3328,7 @@
             <a:fld id="{29F434F8-D001-41C5-B56B-022538BFE3FA}" type="datetimeFigureOut">
               <a:rPr lang="lv-LV" smtClean="0"/>
               <a:pPr/>
-              <a:t>10.06.2022</a:t>
+              <a:t>12.06.2022</a:t>
             </a:fld>
             <a:endParaRPr lang="lv-LV"/>
           </a:p>
@@ -3767,7 +3767,7 @@
             <a:fld id="{29F434F8-D001-41C5-B56B-022538BFE3FA}" type="datetimeFigureOut">
               <a:rPr lang="lv-LV" smtClean="0"/>
               <a:pPr/>
-              <a:t>10.06.2022</a:t>
+              <a:t>12.06.2022</a:t>
             </a:fld>
             <a:endParaRPr lang="lv-LV"/>
           </a:p>
@@ -4330,7 +4330,7 @@
             <a:fld id="{29F434F8-D001-41C5-B56B-022538BFE3FA}" type="datetimeFigureOut">
               <a:rPr lang="lv-LV" smtClean="0"/>
               <a:pPr/>
-              <a:t>10.06.2022</a:t>
+              <a:t>12.06.2022</a:t>
             </a:fld>
             <a:endParaRPr lang="lv-LV"/>
           </a:p>
@@ -4428,7 +4428,7 @@
             <a:fld id="{29F434F8-D001-41C5-B56B-022538BFE3FA}" type="datetimeFigureOut">
               <a:rPr lang="lv-LV" smtClean="0"/>
               <a:pPr/>
-              <a:t>10.06.2022</a:t>
+              <a:t>12.06.2022</a:t>
             </a:fld>
             <a:endParaRPr lang="lv-LV"/>
           </a:p>
@@ -4684,7 +4684,7 @@
             <a:fld id="{29F434F8-D001-41C5-B56B-022538BFE3FA}" type="datetimeFigureOut">
               <a:rPr lang="lv-LV" smtClean="0"/>
               <a:pPr/>
-              <a:t>10.06.2022</a:t>
+              <a:t>12.06.2022</a:t>
             </a:fld>
             <a:endParaRPr lang="lv-LV"/>
           </a:p>
@@ -5407,7 +5407,7 @@
             <a:fld id="{29F434F8-D001-41C5-B56B-022538BFE3FA}" type="datetimeFigureOut">
               <a:rPr lang="lv-LV" smtClean="0"/>
               <a:pPr/>
-              <a:t>10.06.2022</a:t>
+              <a:t>12.06.2022</a:t>
             </a:fld>
             <a:endParaRPr lang="lv-LV"/>
           </a:p>
@@ -6082,7 +6082,7 @@
             <a:fld id="{29F434F8-D001-41C5-B56B-022538BFE3FA}" type="datetimeFigureOut">
               <a:rPr lang="lv-LV" smtClean="0"/>
               <a:pPr/>
-              <a:t>10.06.2022</a:t>
+              <a:t>12.06.2022</a:t>
             </a:fld>
             <a:endParaRPr lang="lv-LV"/>
           </a:p>
@@ -6627,11 +6627,16 @@
             </a:pPr>
             <a:r>
               <a:rPr lang="lv-LV" sz="1800" dirty="0" smtClean="0"/>
-              <a:t>#include&lt;iostream</a:t>
-            </a:r>
+              <a:t>#include&lt;iostream&gt;</a:t>
+            </a:r>
+          </a:p>
+          <a:p>
+            <a:pPr>
+              <a:buNone/>
+            </a:pPr>
             <a:r>
               <a:rPr lang="lv-LV" sz="1800" dirty="0" smtClean="0"/>
-              <a:t>&gt;</a:t>
+              <a:t>using namespace std;</a:t>
             </a:r>
           </a:p>
           <a:p>
@@ -6640,37 +6645,16 @@
             </a:pPr>
             <a:r>
               <a:rPr lang="lv-LV" sz="1800" dirty="0" smtClean="0"/>
-              <a:t>using namespace std</a:t>
-            </a:r>
+              <a:t>int main() {</a:t>
+            </a:r>
+          </a:p>
+          <a:p>
+            <a:pPr>
+              <a:buNone/>
+            </a:pPr>
             <a:r>
               <a:rPr lang="lv-LV" sz="1800" dirty="0" smtClean="0"/>
-              <a:t>;</a:t>
-            </a:r>
-          </a:p>
-          <a:p>
-            <a:pPr>
-              <a:buNone/>
-            </a:pPr>
-            <a:r>
-              <a:rPr lang="lv-LV" sz="1800" dirty="0" smtClean="0"/>
-              <a:t>int main() </a:t>
-            </a:r>
-            <a:r>
-              <a:rPr lang="lv-LV" sz="1800" dirty="0" smtClean="0"/>
-              <a:t>{</a:t>
-            </a:r>
-          </a:p>
-          <a:p>
-            <a:pPr>
-              <a:buNone/>
-            </a:pPr>
-            <a:r>
-              <a:rPr lang="lv-LV" sz="1800" dirty="0" smtClean="0"/>
-              <a:t> string name</a:t>
-            </a:r>
-            <a:r>
-              <a:rPr lang="lv-LV" sz="1800" dirty="0" smtClean="0"/>
-              <a:t>;</a:t>
+              <a:t> string name;</a:t>
             </a:r>
           </a:p>
           <a:p>
@@ -6699,11 +6683,7 @@
             </a:r>
             <a:r>
               <a:rPr lang="de-DE" sz="1800" dirty="0" smtClean="0"/>
-              <a:t>name</a:t>
-            </a:r>
-            <a:r>
-              <a:rPr lang="de-DE" sz="1800" dirty="0" smtClean="0"/>
-              <a:t>;</a:t>
+              <a:t>name;</a:t>
             </a:r>
             <a:endParaRPr lang="lv-LV" sz="1800" dirty="0" smtClean="0"/>
           </a:p>
@@ -6725,11 +6705,7 @@
             </a:r>
             <a:r>
               <a:rPr lang="nn-NO" sz="1800" dirty="0" smtClean="0"/>
-              <a:t>;i</a:t>
-            </a:r>
-            <a:r>
-              <a:rPr lang="nn-NO" sz="1800" dirty="0" smtClean="0"/>
-              <a:t>++){</a:t>
+              <a:t>;i++){</a:t>
             </a:r>
             <a:endParaRPr lang="lv-LV" sz="1800" dirty="0" smtClean="0"/>
           </a:p>
@@ -6747,24 +6723,16 @@
             </a:r>
             <a:r>
               <a:rPr lang="lv-LV" sz="1800" dirty="0" smtClean="0"/>
-              <a:t>name[i]&lt;&lt;"\n</a:t>
-            </a:r>
+              <a:t>name[i]&lt;&lt;"\n";</a:t>
+            </a:r>
+          </a:p>
+          <a:p>
+            <a:pPr>
+              <a:buNone/>
+            </a:pPr>
             <a:r>
               <a:rPr lang="lv-LV" sz="1800" dirty="0" smtClean="0"/>
-              <a:t>";</a:t>
-            </a:r>
-          </a:p>
-          <a:p>
-            <a:pPr>
-              <a:buNone/>
-            </a:pPr>
-            <a:r>
-              <a:rPr lang="lv-LV" sz="1800" dirty="0" smtClean="0"/>
-              <a:t> </a:t>
-            </a:r>
-            <a:r>
-              <a:rPr lang="lv-LV" sz="1800" dirty="0" smtClean="0"/>
-              <a:t>}</a:t>
+              <a:t> }</a:t>
             </a:r>
           </a:p>
           <a:p>
@@ -6978,11 +6946,16 @@
             </a:pPr>
             <a:r>
               <a:rPr lang="lv-LV" sz="1800" dirty="0" smtClean="0"/>
-              <a:t>#include&lt;iostream</a:t>
-            </a:r>
+              <a:t>#include&lt;iostream&gt;</a:t>
+            </a:r>
+          </a:p>
+          <a:p>
+            <a:pPr>
+              <a:buNone/>
+            </a:pPr>
             <a:r>
               <a:rPr lang="lv-LV" sz="1800" dirty="0" smtClean="0"/>
-              <a:t>&gt;</a:t>
+              <a:t>using namespace std;</a:t>
             </a:r>
           </a:p>
           <a:p>
@@ -6991,37 +6964,16 @@
             </a:pPr>
             <a:r>
               <a:rPr lang="lv-LV" sz="1800" dirty="0" smtClean="0"/>
-              <a:t>using namespace std</a:t>
-            </a:r>
+              <a:t>int main() {</a:t>
+            </a:r>
+          </a:p>
+          <a:p>
+            <a:pPr>
+              <a:buNone/>
+            </a:pPr>
             <a:r>
               <a:rPr lang="lv-LV" sz="1800" dirty="0" smtClean="0"/>
-              <a:t>;</a:t>
-            </a:r>
-          </a:p>
-          <a:p>
-            <a:pPr>
-              <a:buNone/>
-            </a:pPr>
-            <a:r>
-              <a:rPr lang="lv-LV" sz="1800" dirty="0" smtClean="0"/>
-              <a:t>int main() </a:t>
-            </a:r>
-            <a:r>
-              <a:rPr lang="lv-LV" sz="1800" dirty="0" smtClean="0"/>
-              <a:t>{</a:t>
-            </a:r>
-          </a:p>
-          <a:p>
-            <a:pPr>
-              <a:buNone/>
-            </a:pPr>
-            <a:r>
-              <a:rPr lang="lv-LV" sz="1800" dirty="0" smtClean="0"/>
-              <a:t> string name</a:t>
-            </a:r>
-            <a:r>
-              <a:rPr lang="lv-LV" sz="1800" dirty="0" smtClean="0"/>
-              <a:t>;</a:t>
+              <a:t> string name;</a:t>
             </a:r>
           </a:p>
           <a:p>
@@ -7054,11 +7006,7 @@
             </a:r>
             <a:r>
               <a:rPr lang="de-DE" sz="1800" dirty="0" smtClean="0"/>
-              <a:t>name</a:t>
-            </a:r>
-            <a:r>
-              <a:rPr lang="de-DE" sz="1800" dirty="0" smtClean="0"/>
-              <a:t>;</a:t>
+              <a:t>name;</a:t>
             </a:r>
             <a:endParaRPr lang="lv-LV" sz="1800" dirty="0" smtClean="0"/>
           </a:p>
@@ -7080,11 +7028,7 @@
             </a:r>
             <a:r>
               <a:rPr lang="lv-LV" sz="1800" dirty="0" smtClean="0"/>
-              <a:t>Apmestais vārds ir: </a:t>
-            </a:r>
-            <a:r>
-              <a:rPr lang="lv-LV" sz="1800" dirty="0" smtClean="0"/>
-              <a:t>";</a:t>
+              <a:t>Apmestais vārds ir: ";</a:t>
             </a:r>
           </a:p>
           <a:p>
@@ -7105,11 +7049,7 @@
             </a:r>
             <a:r>
               <a:rPr lang="nn-NO" sz="1800" dirty="0" smtClean="0"/>
-              <a:t>i&gt;=0;i-</a:t>
-            </a:r>
-            <a:r>
-              <a:rPr lang="nn-NO" sz="1800" dirty="0" smtClean="0"/>
-              <a:t>-){</a:t>
+              <a:t>i&gt;=0;i--){</a:t>
             </a:r>
             <a:endParaRPr lang="lv-LV" sz="1800" dirty="0" smtClean="0"/>
           </a:p>
@@ -7123,15 +7063,7 @@
                   <a:srgbClr val="FF0000"/>
                 </a:solidFill>
               </a:rPr>
-              <a:t> cout&lt;&lt;name[i</a:t>
-            </a:r>
-            <a:r>
-              <a:rPr lang="lv-LV" sz="1800" dirty="0" smtClean="0">
-                <a:solidFill>
-                  <a:srgbClr val="FF0000"/>
-                </a:solidFill>
-              </a:rPr>
-              <a:t>];</a:t>
+              <a:t> cout&lt;&lt;name[i];</a:t>
             </a:r>
           </a:p>
           <a:p>
@@ -7140,11 +7072,7 @@
             </a:pPr>
             <a:r>
               <a:rPr lang="lv-LV" sz="1800" dirty="0" smtClean="0"/>
-              <a:t> </a:t>
-            </a:r>
-            <a:r>
-              <a:rPr lang="lv-LV" sz="1800" dirty="0" smtClean="0"/>
-              <a:t>}</a:t>
+              <a:t> }</a:t>
             </a:r>
           </a:p>
           <a:p>
@@ -7396,11 +7324,7 @@
             </a:pPr>
             <a:r>
               <a:rPr lang="lv-LV" sz="1800" dirty="0" smtClean="0"/>
-              <a:t>#include&lt;iostream</a:t>
-            </a:r>
-            <a:r>
-              <a:rPr lang="lv-LV" sz="1800" dirty="0" smtClean="0"/>
-              <a:t>&gt;</a:t>
+              <a:t>#include&lt;iostream&gt;</a:t>
             </a:r>
           </a:p>
           <a:p>
@@ -7413,41 +7337,38 @@
                   <a:srgbClr val="FF0000"/>
                 </a:solidFill>
               </a:rPr>
-              <a:t>#include &lt;fstream</a:t>
-            </a:r>
+              <a:t>#include &lt;fstream&gt;</a:t>
+            </a:r>
+          </a:p>
+          <a:p>
+            <a:pPr>
+              <a:buNone/>
+            </a:pPr>
+            <a:r>
+              <a:rPr lang="lv-LV" sz="1800" dirty="0" smtClean="0"/>
+              <a:t>using namespace std;</a:t>
+            </a:r>
+          </a:p>
+          <a:p>
+            <a:pPr>
+              <a:buNone/>
+            </a:pPr>
+            <a:r>
+              <a:rPr lang="lv-LV" sz="1800" dirty="0" smtClean="0"/>
+              <a:t>int main() {</a:t>
+            </a:r>
+          </a:p>
+          <a:p>
+            <a:pPr>
+              <a:buNone/>
+            </a:pPr>
             <a:r>
               <a:rPr lang="lv-LV" sz="1800" dirty="0" smtClean="0">
                 <a:solidFill>
                   <a:srgbClr val="FF0000"/>
                 </a:solidFill>
               </a:rPr>
-              <a:t>&gt;</a:t>
-            </a:r>
-          </a:p>
-          <a:p>
-            <a:pPr>
-              <a:buNone/>
-            </a:pPr>
-            <a:r>
-              <a:rPr lang="lv-LV" sz="1800" dirty="0" smtClean="0"/>
-              <a:t>using namespace std</a:t>
-            </a:r>
-            <a:r>
-              <a:rPr lang="lv-LV" sz="1800" dirty="0" smtClean="0"/>
-              <a:t>;</a:t>
-            </a:r>
-          </a:p>
-          <a:p>
-            <a:pPr>
-              <a:buNone/>
-            </a:pPr>
-            <a:r>
-              <a:rPr lang="lv-LV" sz="1800" dirty="0" smtClean="0"/>
-              <a:t>int main() </a:t>
-            </a:r>
-            <a:r>
-              <a:rPr lang="lv-LV" sz="1800" dirty="0" smtClean="0"/>
-              <a:t>{</a:t>
+              <a:t>ofstream file("ASCII.txt");</a:t>
             </a:r>
           </a:p>
           <a:p>
@@ -7460,15 +7381,20 @@
                   <a:srgbClr val="FF0000"/>
                 </a:solidFill>
               </a:rPr>
-              <a:t>ofstream file("ASCII.txt</a:t>
-            </a:r>
+              <a:t> file &lt;&lt; " __________\n“</a:t>
+            </a:r>
+          </a:p>
+          <a:p>
+            <a:pPr>
+              <a:buNone/>
+            </a:pPr>
             <a:r>
               <a:rPr lang="lv-LV" sz="1800" dirty="0" smtClean="0">
                 <a:solidFill>
                   <a:srgbClr val="FF0000"/>
                 </a:solidFill>
               </a:rPr>
-              <a:t>");</a:t>
+              <a:t> "| ________ |\n“</a:t>
             </a:r>
           </a:p>
           <a:p>
@@ -7481,15 +7407,20 @@
                   <a:srgbClr val="FF0000"/>
                 </a:solidFill>
               </a:rPr>
-              <a:t> file &lt;&lt; " __________\</a:t>
-            </a:r>
+              <a:t> "||12345678||\n“</a:t>
+            </a:r>
+          </a:p>
+          <a:p>
+            <a:pPr>
+              <a:buNone/>
+            </a:pPr>
             <a:r>
               <a:rPr lang="lv-LV" sz="1800" dirty="0" smtClean="0">
                 <a:solidFill>
                   <a:srgbClr val="FF0000"/>
                 </a:solidFill>
               </a:rPr>
-              <a:t>n“</a:t>
+              <a:t> "|\"\"\"\"\"\"\"\"\"\"|\n“</a:t>
             </a:r>
           </a:p>
           <a:p>
@@ -7502,15 +7433,20 @@
                   <a:srgbClr val="FF0000"/>
                 </a:solidFill>
               </a:rPr>
-              <a:t> "| ________ |\</a:t>
-            </a:r>
+              <a:t> "|[M|#|C][-]|\n“</a:t>
+            </a:r>
+          </a:p>
+          <a:p>
+            <a:pPr>
+              <a:buNone/>
+            </a:pPr>
             <a:r>
               <a:rPr lang="lv-LV" sz="1800" dirty="0" smtClean="0">
                 <a:solidFill>
                   <a:srgbClr val="FF0000"/>
                 </a:solidFill>
               </a:rPr>
-              <a:t>n“</a:t>
+              <a:t> "|[7|8|9][+]|\n“</a:t>
             </a:r>
           </a:p>
           <a:p>
@@ -7523,15 +7459,20 @@
                   <a:srgbClr val="FF0000"/>
                 </a:solidFill>
               </a:rPr>
-              <a:t> "||12345678||\</a:t>
-            </a:r>
+              <a:t> "|[4|5|6][x]|\n“</a:t>
+            </a:r>
+          </a:p>
+          <a:p>
+            <a:pPr>
+              <a:buNone/>
+            </a:pPr>
             <a:r>
               <a:rPr lang="lv-LV" sz="1800" dirty="0" smtClean="0">
                 <a:solidFill>
                   <a:srgbClr val="FF0000"/>
                 </a:solidFill>
               </a:rPr>
-              <a:t>n“</a:t>
+              <a:t> "|[1|2|3][%]|\n“</a:t>
             </a:r>
           </a:p>
           <a:p>
@@ -7544,15 +7485,20 @@
                   <a:srgbClr val="FF0000"/>
                 </a:solidFill>
               </a:rPr>
-              <a:t> "|\"\"\"\"\"\"\"\"\"\"|\</a:t>
-            </a:r>
+              <a:t> "|[.|O|:][=]|\n“</a:t>
+            </a:r>
+          </a:p>
+          <a:p>
+            <a:pPr>
+              <a:buNone/>
+            </a:pPr>
             <a:r>
               <a:rPr lang="lv-LV" sz="1800" dirty="0" smtClean="0">
                 <a:solidFill>
                   <a:srgbClr val="FF0000"/>
                 </a:solidFill>
               </a:rPr>
-              <a:t>n“</a:t>
+              <a:t> "\"----------\"\n";</a:t>
             </a:r>
           </a:p>
           <a:p>
@@ -7560,138 +7506,8 @@
               <a:buNone/>
             </a:pPr>
             <a:r>
-              <a:rPr lang="lv-LV" sz="1800" dirty="0" smtClean="0">
-                <a:solidFill>
-                  <a:srgbClr val="FF0000"/>
-                </a:solidFill>
-              </a:rPr>
-              <a:t> "|[M|#|C][-]|\</a:t>
-            </a:r>
-            <a:r>
-              <a:rPr lang="lv-LV" sz="1800" dirty="0" smtClean="0">
-                <a:solidFill>
-                  <a:srgbClr val="FF0000"/>
-                </a:solidFill>
-              </a:rPr>
-              <a:t>n“</a:t>
-            </a:r>
-          </a:p>
-          <a:p>
-            <a:pPr>
-              <a:buNone/>
-            </a:pPr>
-            <a:r>
-              <a:rPr lang="lv-LV" sz="1800" dirty="0" smtClean="0">
-                <a:solidFill>
-                  <a:srgbClr val="FF0000"/>
-                </a:solidFill>
-              </a:rPr>
-              <a:t> "|[7|8|9][+]|\</a:t>
-            </a:r>
-            <a:r>
-              <a:rPr lang="lv-LV" sz="1800" dirty="0" smtClean="0">
-                <a:solidFill>
-                  <a:srgbClr val="FF0000"/>
-                </a:solidFill>
-              </a:rPr>
-              <a:t>n“</a:t>
-            </a:r>
-          </a:p>
-          <a:p>
-            <a:pPr>
-              <a:buNone/>
-            </a:pPr>
-            <a:r>
-              <a:rPr lang="lv-LV" sz="1800" dirty="0" smtClean="0">
-                <a:solidFill>
-                  <a:srgbClr val="FF0000"/>
-                </a:solidFill>
-              </a:rPr>
-              <a:t> "|[4|5|6][x]|\</a:t>
-            </a:r>
-            <a:r>
-              <a:rPr lang="lv-LV" sz="1800" dirty="0" smtClean="0">
-                <a:solidFill>
-                  <a:srgbClr val="FF0000"/>
-                </a:solidFill>
-              </a:rPr>
-              <a:t>n“</a:t>
-            </a:r>
-          </a:p>
-          <a:p>
-            <a:pPr>
-              <a:buNone/>
-            </a:pPr>
-            <a:r>
-              <a:rPr lang="lv-LV" sz="1800" dirty="0" smtClean="0">
-                <a:solidFill>
-                  <a:srgbClr val="FF0000"/>
-                </a:solidFill>
-              </a:rPr>
-              <a:t> "|[1|2|3][%]|\</a:t>
-            </a:r>
-            <a:r>
-              <a:rPr lang="lv-LV" sz="1800" dirty="0" smtClean="0">
-                <a:solidFill>
-                  <a:srgbClr val="FF0000"/>
-                </a:solidFill>
-              </a:rPr>
-              <a:t>n“</a:t>
-            </a:r>
-          </a:p>
-          <a:p>
-            <a:pPr>
-              <a:buNone/>
-            </a:pPr>
-            <a:r>
-              <a:rPr lang="lv-LV" sz="1800" dirty="0" smtClean="0">
-                <a:solidFill>
-                  <a:srgbClr val="FF0000"/>
-                </a:solidFill>
-              </a:rPr>
-              <a:t> "|[.|O|:][=]|\</a:t>
-            </a:r>
-            <a:r>
-              <a:rPr lang="lv-LV" sz="1800" dirty="0" smtClean="0">
-                <a:solidFill>
-                  <a:srgbClr val="FF0000"/>
-                </a:solidFill>
-              </a:rPr>
-              <a:t>n“</a:t>
-            </a:r>
-          </a:p>
-          <a:p>
-            <a:pPr>
-              <a:buNone/>
-            </a:pPr>
-            <a:r>
-              <a:rPr lang="lv-LV" sz="1800" dirty="0" smtClean="0">
-                <a:solidFill>
-                  <a:srgbClr val="FF0000"/>
-                </a:solidFill>
-              </a:rPr>
-              <a:t> "\"----------\"\n</a:t>
-            </a:r>
-            <a:r>
-              <a:rPr lang="lv-LV" sz="1800" dirty="0" smtClean="0">
-                <a:solidFill>
-                  <a:srgbClr val="FF0000"/>
-                </a:solidFill>
-              </a:rPr>
-              <a:t>";</a:t>
-            </a:r>
-          </a:p>
-          <a:p>
-            <a:pPr>
-              <a:buNone/>
-            </a:pPr>
-            <a:r>
               <a:rPr lang="lv-LV" sz="1800" dirty="0" smtClean="0"/>
-              <a:t>file.close</a:t>
-            </a:r>
-            <a:r>
-              <a:rPr lang="lv-LV" sz="1800" dirty="0" smtClean="0"/>
-              <a:t>();</a:t>
+              <a:t>file.close();</a:t>
             </a:r>
           </a:p>
           <a:p>
@@ -8246,7 +8062,15 @@
           <a:p>
             <a:r>
               <a:rPr lang="lv-LV" sz="2400" dirty="0" smtClean="0"/>
-              <a:t>Var arī nolasīt un izprintēt ar ofstream, ifstream, fstream palīdzību.</a:t>
+              <a:t>Var arī nolasīt un </a:t>
+            </a:r>
+            <a:r>
+              <a:rPr lang="lv-LV" sz="2400" dirty="0" smtClean="0"/>
+              <a:t>izprintēt failus </a:t>
+            </a:r>
+            <a:r>
+              <a:rPr lang="lv-LV" sz="2400" dirty="0" smtClean="0"/>
+              <a:t>ar ofstream, ifstream, fstream palīdzību.</a:t>
             </a:r>
             <a:endParaRPr lang="lv-LV" sz="2400" dirty="0"/>
           </a:p>
@@ -8451,11 +8275,7 @@
             </a:pPr>
             <a:r>
               <a:rPr lang="lv-LV" sz="2000" dirty="0" smtClean="0"/>
-              <a:t>#include&lt;iostream</a:t>
-            </a:r>
-            <a:r>
-              <a:rPr lang="lv-LV" sz="2000" dirty="0" smtClean="0"/>
-              <a:t>&gt;</a:t>
+              <a:t>#include&lt;iostream&gt;</a:t>
             </a:r>
           </a:p>
           <a:p>
@@ -8672,11 +8492,7 @@
             </a:r>
             <a:r>
               <a:rPr lang="lv-LV" sz="2000" dirty="0" smtClean="0"/>
-              <a:t>&gt;s4</a:t>
-            </a:r>
-            <a:r>
-              <a:rPr lang="lv-LV" sz="2000" dirty="0" smtClean="0"/>
-              <a:t>;</a:t>
+              <a:t>&gt;s4;</a:t>
             </a:r>
           </a:p>
           <a:p>
@@ -8954,11 +8770,7 @@
             </a:pPr>
             <a:r>
               <a:rPr lang="lv-LV" sz="1800" dirty="0" smtClean="0"/>
-              <a:t>#include&lt;iostream</a:t>
-            </a:r>
-            <a:r>
-              <a:rPr lang="lv-LV" sz="1800" dirty="0" smtClean="0"/>
-              <a:t>&gt;</a:t>
+              <a:t>#include&lt;iostream&gt;</a:t>
             </a:r>
           </a:p>
           <a:p>
@@ -8971,15 +8783,38 @@
                   <a:srgbClr val="FF0000"/>
                 </a:solidFill>
               </a:rPr>
-              <a:t>#include &lt;</a:t>
-            </a:r>
+              <a:t>#include &lt;fstream&gt;</a:t>
+            </a:r>
+          </a:p>
+          <a:p>
+            <a:pPr>
+              <a:buNone/>
+            </a:pPr>
+            <a:r>
+              <a:rPr lang="lv-LV" sz="1800" dirty="0" smtClean="0"/>
+              <a:t>using namespace std;</a:t>
+            </a:r>
+          </a:p>
+          <a:p>
+            <a:pPr>
+              <a:buNone/>
+            </a:pPr>
+            <a:r>
+              <a:rPr lang="lv-LV" sz="1800" dirty="0" smtClean="0"/>
+              <a:t>int main() {</a:t>
+            </a:r>
+          </a:p>
+          <a:p>
+            <a:pPr>
+              <a:buNone/>
+            </a:pPr>
             <a:r>
               <a:rPr lang="lv-LV" sz="1800" dirty="0" smtClean="0">
                 <a:solidFill>
                   <a:srgbClr val="FF0000"/>
                 </a:solidFill>
               </a:rPr>
-              <a:t>fstream&gt;</a:t>
+              <a:t> ifstream file ("text.txt");</a:t>
             </a:r>
           </a:p>
           <a:p>
@@ -8988,24 +8823,7 @@
             </a:pPr>
             <a:r>
               <a:rPr lang="lv-LV" sz="1800" dirty="0" smtClean="0"/>
-              <a:t>using namespace std</a:t>
-            </a:r>
-            <a:r>
-              <a:rPr lang="lv-LV" sz="1800" dirty="0" smtClean="0"/>
-              <a:t>;</a:t>
-            </a:r>
-          </a:p>
-          <a:p>
-            <a:pPr>
-              <a:buNone/>
-            </a:pPr>
-            <a:r>
-              <a:rPr lang="lv-LV" sz="1800" dirty="0" smtClean="0"/>
-              <a:t>int main() </a:t>
-            </a:r>
-            <a:r>
-              <a:rPr lang="lv-LV" sz="1800" dirty="0" smtClean="0"/>
-              <a:t>{</a:t>
+              <a:t>string name;</a:t>
             </a:r>
           </a:p>
           <a:p>
@@ -9018,15 +8836,7 @@
                   <a:srgbClr val="FF0000"/>
                 </a:solidFill>
               </a:rPr>
-              <a:t> ifstream file ("text.txt</a:t>
-            </a:r>
-            <a:r>
-              <a:rPr lang="lv-LV" sz="1800" dirty="0" smtClean="0">
-                <a:solidFill>
-                  <a:srgbClr val="FF0000"/>
-                </a:solidFill>
-              </a:rPr>
-              <a:t>");</a:t>
+              <a:t> getline (file, name);</a:t>
             </a:r>
           </a:p>
           <a:p>
@@ -9035,45 +8845,7 @@
             </a:pPr>
             <a:r>
               <a:rPr lang="lv-LV" sz="1800" dirty="0" smtClean="0"/>
-              <a:t>string name</a:t>
-            </a:r>
-            <a:r>
-              <a:rPr lang="lv-LV" sz="1800" dirty="0" smtClean="0"/>
-              <a:t>;</a:t>
-            </a:r>
-          </a:p>
-          <a:p>
-            <a:pPr>
-              <a:buNone/>
-            </a:pPr>
-            <a:r>
-              <a:rPr lang="lv-LV" sz="1800" dirty="0" smtClean="0">
-                <a:solidFill>
-                  <a:srgbClr val="FF0000"/>
-                </a:solidFill>
-              </a:rPr>
-              <a:t> getline (file, name</a:t>
-            </a:r>
-            <a:r>
-              <a:rPr lang="lv-LV" sz="1800" dirty="0" smtClean="0">
-                <a:solidFill>
-                  <a:srgbClr val="FF0000"/>
-                </a:solidFill>
-              </a:rPr>
-              <a:t>);</a:t>
-            </a:r>
-          </a:p>
-          <a:p>
-            <a:pPr>
-              <a:buNone/>
-            </a:pPr>
-            <a:r>
-              <a:rPr lang="lv-LV" sz="1800" dirty="0" smtClean="0"/>
-              <a:t> cout&lt;&lt;"No \""&lt;&lt;name&lt;&lt;"\" pārveido uz \"Skola drīz atkal sāksies</a:t>
-            </a:r>
-            <a:r>
-              <a:rPr lang="lv-LV" sz="1800" dirty="0" smtClean="0"/>
-              <a:t>!\"";</a:t>
+              <a:t> cout&lt;&lt;"No \""&lt;&lt;name&lt;&lt;"\" pārveido uz \"Skola drīz atkal sāksies!\"";</a:t>
             </a:r>
           </a:p>
           <a:p>
@@ -9094,11 +8866,7 @@
             </a:r>
             <a:r>
               <a:rPr lang="lv-LV" sz="1800" dirty="0" smtClean="0"/>
-              <a:t>atkal sāksies</a:t>
-            </a:r>
-            <a:r>
-              <a:rPr lang="lv-LV" sz="1800" dirty="0" smtClean="0"/>
-              <a:t>!";</a:t>
+              <a:t>atkal sāksies!";</a:t>
             </a:r>
           </a:p>
           <a:p>
@@ -9115,15 +8883,7 @@
                   <a:srgbClr val="FF0000"/>
                 </a:solidFill>
               </a:rPr>
-              <a:t>ofstream MyFile("text.txt</a:t>
-            </a:r>
-            <a:r>
-              <a:rPr lang="lv-LV" sz="1800" dirty="0" smtClean="0">
-                <a:solidFill>
-                  <a:srgbClr val="FF0000"/>
-                </a:solidFill>
-              </a:rPr>
-              <a:t>");</a:t>
+              <a:t>ofstream MyFile("text.txt");</a:t>
             </a:r>
           </a:p>
           <a:p>
@@ -9132,24 +8892,16 @@
             </a:pPr>
             <a:r>
               <a:rPr lang="lv-LV" sz="1800" dirty="0" smtClean="0"/>
-              <a:t> MyFile &lt;&lt; name</a:t>
-            </a:r>
+              <a:t> MyFile &lt;&lt; name;</a:t>
+            </a:r>
+          </a:p>
+          <a:p>
+            <a:pPr>
+              <a:buNone/>
+            </a:pPr>
             <a:r>
               <a:rPr lang="lv-LV" sz="1800" dirty="0" smtClean="0"/>
-              <a:t>;</a:t>
-            </a:r>
-          </a:p>
-          <a:p>
-            <a:pPr>
-              <a:buNone/>
-            </a:pPr>
-            <a:r>
-              <a:rPr lang="lv-LV" sz="1800" dirty="0" smtClean="0"/>
-              <a:t>MyFile.close</a:t>
-            </a:r>
-            <a:r>
-              <a:rPr lang="lv-LV" sz="1800" dirty="0" smtClean="0"/>
-              <a:t>();</a:t>
+              <a:t>MyFile.close();</a:t>
             </a:r>
           </a:p>
           <a:p>

</xml_diff>

<commit_message>
Informatīvā materiāla pēdēja pielabošana, PILNIGI GATAVS PROJEKTS
</commit_message>
<xml_diff>
--- a/Teksta datnes informatīvais materiāls.pptx
+++ b/Teksta datnes informatīvais materiāls.pptx
@@ -6683,7 +6683,21 @@
             </a:r>
             <a:r>
               <a:rPr lang="de-DE" sz="1800" dirty="0" smtClean="0"/>
-              <a:t>name;</a:t>
+              <a:t>name</a:t>
+            </a:r>
+            <a:r>
+              <a:rPr lang="de-DE" sz="1800" dirty="0" smtClean="0"/>
+              <a:t>;</a:t>
+            </a:r>
+            <a:endParaRPr lang="lv-LV" sz="1800" dirty="0" smtClean="0"/>
+          </a:p>
+          <a:p>
+            <a:pPr>
+              <a:buNone/>
+            </a:pPr>
+            <a:r>
+              <a:rPr lang="lv-LV" sz="1800" dirty="0" smtClean="0"/>
+              <a:t>//funkcijas kā .length() nolasa string vērtības garumu</a:t>
             </a:r>
             <a:endParaRPr lang="lv-LV" sz="1800" dirty="0" smtClean="0"/>
           </a:p>
@@ -8062,15 +8076,7 @@
           <a:p>
             <a:r>
               <a:rPr lang="lv-LV" sz="2400" dirty="0" smtClean="0"/>
-              <a:t>Var arī nolasīt un </a:t>
-            </a:r>
-            <a:r>
-              <a:rPr lang="lv-LV" sz="2400" dirty="0" smtClean="0"/>
-              <a:t>izprintēt failus </a:t>
-            </a:r>
-            <a:r>
-              <a:rPr lang="lv-LV" sz="2400" dirty="0" smtClean="0"/>
-              <a:t>ar ofstream, ifstream, fstream palīdzību.</a:t>
+              <a:t>Var arī nolasīt un izprintēt failus ar ofstream, ifstream, fstream palīdzību.</a:t>
             </a:r>
             <a:endParaRPr lang="lv-LV" sz="2400" dirty="0"/>
           </a:p>
@@ -8266,7 +8272,7 @@
         <p:spPr/>
         <p:txBody>
           <a:bodyPr>
-            <a:normAutofit fontScale="92500" lnSpcReduction="20000"/>
+            <a:normAutofit fontScale="70000" lnSpcReduction="20000"/>
           </a:bodyPr>
           <a:lstStyle/>
           <a:p>
@@ -8302,8 +8308,22 @@
             </a:pPr>
             <a:r>
               <a:rPr lang="lv-LV" sz="2000" dirty="0" smtClean="0"/>
-              <a:t>    string s1,s2,s3, s4, name="";</a:t>
-            </a:r>
+              <a:t>    string s1,s2,s3, s4, name</a:t>
+            </a:r>
+            <a:r>
+              <a:rPr lang="lv-LV" sz="2000" dirty="0" smtClean="0"/>
+              <a:t>="";</a:t>
+            </a:r>
+          </a:p>
+          <a:p>
+            <a:pPr>
+              <a:buNone/>
+            </a:pPr>
+            <a:r>
+              <a:rPr lang="lv-LV" sz="2000" dirty="0" smtClean="0"/>
+              <a:t>//cout izvada tekstu konsolē</a:t>
+            </a:r>
+            <a:endParaRPr lang="lv-LV" sz="2000" dirty="0" smtClean="0"/>
           </a:p>
           <a:p>
             <a:pPr>
@@ -8328,8 +8348,26 @@
             </a:pPr>
             <a:r>
               <a:rPr lang="lv-LV" sz="2000" dirty="0" smtClean="0"/>
-              <a:t>do{</a:t>
-            </a:r>
+              <a:t>do</a:t>
+            </a:r>
+            <a:r>
+              <a:rPr lang="lv-LV" sz="2000" dirty="0" smtClean="0"/>
+              <a:t>{</a:t>
+            </a:r>
+          </a:p>
+          <a:p>
+            <a:pPr>
+              <a:buNone/>
+            </a:pPr>
+            <a:r>
+              <a:rPr lang="lv-LV" sz="2000" dirty="0" smtClean="0"/>
+              <a:t> </a:t>
+            </a:r>
+            <a:r>
+              <a:rPr lang="lv-LV" sz="2000" dirty="0" smtClean="0"/>
+              <a:t>                                                            // cin ļauj lietotājam ievadīt vērtību konsolē</a:t>
+            </a:r>
+            <a:endParaRPr lang="lv-LV" sz="2000" dirty="0" smtClean="0"/>
           </a:p>
           <a:p>
             <a:pPr>
@@ -8492,8 +8530,22 @@
             </a:r>
             <a:r>
               <a:rPr lang="lv-LV" sz="2000" dirty="0" smtClean="0"/>
-              <a:t>&gt;s4;</a:t>
-            </a:r>
+              <a:t>&gt;s4</a:t>
+            </a:r>
+            <a:r>
+              <a:rPr lang="lv-LV" sz="2000" dirty="0" smtClean="0"/>
+              <a:t>;</a:t>
+            </a:r>
+          </a:p>
+          <a:p>
+            <a:pPr>
+              <a:buNone/>
+            </a:pPr>
+            <a:r>
+              <a:rPr lang="lv-LV" sz="2000" dirty="0" smtClean="0"/>
+              <a:t>//Var matemātiski string vērtības sasummēt kopā</a:t>
+            </a:r>
+            <a:endParaRPr lang="lv-LV" sz="2000" dirty="0" smtClean="0"/>
           </a:p>
           <a:p>
             <a:pPr>
@@ -8761,7 +8813,7 @@
         <p:spPr/>
         <p:txBody>
           <a:bodyPr>
-            <a:normAutofit lnSpcReduction="10000"/>
+            <a:normAutofit fontScale="85000" lnSpcReduction="20000"/>
           </a:bodyPr>
           <a:lstStyle/>
           <a:p>
@@ -8770,8 +8822,13 @@
             </a:pPr>
             <a:r>
               <a:rPr lang="lv-LV" sz="1800" dirty="0" smtClean="0"/>
-              <a:t>#include&lt;iostream&gt;</a:t>
-            </a:r>
+              <a:t>#include&lt;iostream</a:t>
+            </a:r>
+            <a:r>
+              <a:rPr lang="lv-LV" sz="1800" dirty="0" smtClean="0"/>
+              <a:t>&gt;</a:t>
+            </a:r>
+            <a:endParaRPr lang="lv-LV" sz="1800" dirty="0" smtClean="0"/>
           </a:p>
           <a:p>
             <a:pPr>
@@ -8801,8 +8858,22 @@
             </a:pPr>
             <a:r>
               <a:rPr lang="lv-LV" sz="1800" dirty="0" smtClean="0"/>
-              <a:t>int main() {</a:t>
-            </a:r>
+              <a:t>int main() </a:t>
+            </a:r>
+            <a:r>
+              <a:rPr lang="lv-LV" sz="1800" dirty="0" smtClean="0"/>
+              <a:t>{</a:t>
+            </a:r>
+          </a:p>
+          <a:p>
+            <a:pPr>
+              <a:buNone/>
+            </a:pPr>
+            <a:r>
+              <a:rPr lang="lv-LV" sz="1800" dirty="0" smtClean="0"/>
+              <a:t>//ifstream atver un ļauj nolasīt failu</a:t>
+            </a:r>
+            <a:endParaRPr lang="lv-LV" sz="1800" dirty="0" smtClean="0"/>
           </a:p>
           <a:p>
             <a:pPr>
@@ -8823,8 +8894,22 @@
             </a:pPr>
             <a:r>
               <a:rPr lang="lv-LV" sz="1800" dirty="0" smtClean="0"/>
-              <a:t>string name;</a:t>
-            </a:r>
+              <a:t>string name</a:t>
+            </a:r>
+            <a:r>
+              <a:rPr lang="lv-LV" sz="1800" dirty="0" smtClean="0"/>
+              <a:t>;</a:t>
+            </a:r>
+          </a:p>
+          <a:p>
+            <a:pPr>
+              <a:buNone/>
+            </a:pPr>
+            <a:r>
+              <a:rPr lang="lv-LV" sz="1800" dirty="0" smtClean="0"/>
+              <a:t>//Ar getline nolasa visu rindu</a:t>
+            </a:r>
+            <a:endParaRPr lang="lv-LV" sz="1800" dirty="0" smtClean="0"/>
           </a:p>
           <a:p>
             <a:pPr>
@@ -8866,8 +8951,22 @@
             </a:r>
             <a:r>
               <a:rPr lang="lv-LV" sz="1800" dirty="0" smtClean="0"/>
-              <a:t>atkal sāksies!";</a:t>
-            </a:r>
+              <a:t>atkal sāksies</a:t>
+            </a:r>
+            <a:r>
+              <a:rPr lang="lv-LV" sz="1800" dirty="0" smtClean="0"/>
+              <a:t>!";</a:t>
+            </a:r>
+          </a:p>
+          <a:p>
+            <a:pPr>
+              <a:buNone/>
+            </a:pPr>
+            <a:r>
+              <a:rPr lang="lv-LV" sz="1800" dirty="0" smtClean="0"/>
+              <a:t>//ofstream atver un ieraksta failā</a:t>
+            </a:r>
+            <a:endParaRPr lang="lv-LV" sz="1800" dirty="0" smtClean="0"/>
           </a:p>
           <a:p>
             <a:pPr>

</xml_diff>